<commit_message>
Added a little bit to future works slide
</commit_message>
<xml_diff>
--- a/NN_FINAL.pptx
+++ b/NN_FINAL.pptx
@@ -4923,6 +4923,13 @@
               <a:t>Normal Sampling vs Oversampling</a:t>
             </a:r>
           </a:p>
+          <a:p>
+            <a:pPr lvl="1"/>
+            <a:r>
+              <a:rPr lang="en-US" dirty="0"/>
+              <a:t>Using 3 times the training data</a:t>
+            </a:r>
+          </a:p>
         </p:txBody>
       </p:sp>
     </p:spTree>
@@ -5584,7 +5591,9 @@
         </p:nvSpPr>
         <p:spPr/>
         <p:txBody>
-          <a:bodyPr/>
+          <a:bodyPr>
+            <a:normAutofit fontScale="62500" lnSpcReduction="20000"/>
+          </a:bodyPr>
           <a:lstStyle/>
           <a:p>
             <a:r>
@@ -5607,6 +5616,13 @@
             </a:r>
           </a:p>
           <a:p>
+            <a:pPr lvl="2"/>
+            <a:r>
+              <a:rPr lang="en-US" dirty="0"/>
+              <a:t>Filters are window/kernel sizes (it will form a numerical representation over n number of words, characters, etc.)</a:t>
+            </a:r>
+          </a:p>
+          <a:p>
             <a:pPr lvl="1"/>
             <a:r>
               <a:rPr lang="en-US" dirty="0"/>
@@ -5616,7 +5632,32 @@
           <a:p>
             <a:r>
               <a:rPr lang="en-US" dirty="0"/>
+              <a:t>Change Activation Methods</a:t>
+            </a:r>
+          </a:p>
+          <a:p>
+            <a:r>
+              <a:rPr lang="en-US" dirty="0"/>
+              <a:t>Change Loss Metric</a:t>
+            </a:r>
+          </a:p>
+          <a:p>
+            <a:r>
+              <a:rPr lang="en-US" dirty="0"/>
+              <a:t>Adjust Learning Rate</a:t>
+            </a:r>
+          </a:p>
+          <a:p>
+            <a:r>
+              <a:rPr lang="en-US" dirty="0"/>
               <a:t>Mess Around with Punctuation</a:t>
+            </a:r>
+          </a:p>
+          <a:p>
+            <a:pPr lvl="1"/>
+            <a:r>
+              <a:rPr lang="en-US" dirty="0"/>
+              <a:t>Use punctuation as individual “words”</a:t>
             </a:r>
           </a:p>
           <a:p>

</xml_diff>